<commit_message>
2e slide de la présentation
</commit_message>
<xml_diff>
--- a/Présentation - Powerpoint.pptx
+++ b/Présentation - Powerpoint.pptx
@@ -1648,8 +1648,8 @@
         </p:nvSpPr>
         <p:spPr>
           <a:xfrm>
-            <a:off x="17766303" y="7721821"/>
-            <a:ext cx="6544123" cy="2800767"/>
+            <a:off x="17317725" y="7997869"/>
+            <a:ext cx="7181289" cy="2308324"/>
           </a:xfrm>
           <a:prstGeom prst="rect">
             <a:avLst/>
@@ -1664,7 +1664,7 @@
           <a:p>
             <a:pPr algn="just"/>
             <a:r>
-              <a:rPr lang="fr-FR" sz="8800" b="1" dirty="0">
+              <a:rPr lang="fr-FR" sz="7200" b="1" dirty="0">
                 <a:latin typeface="Poppins Bold" panose="02000000000000000000"/>
               </a:rPr>
               <a:t>Présentation du projet 632</a:t>
@@ -1686,8 +1686,8 @@
         </p:nvSpPr>
         <p:spPr>
           <a:xfrm>
-            <a:off x="17766304" y="10471579"/>
-            <a:ext cx="5469774" cy="646331"/>
+            <a:off x="17421244" y="10471579"/>
+            <a:ext cx="5714802" cy="646331"/>
           </a:xfrm>
           <a:prstGeom prst="rect">
             <a:avLst/>
@@ -1745,7 +1745,7 @@
         </p:blipFill>
         <p:spPr bwMode="auto">
           <a:xfrm>
-            <a:off x="11295278" y="7383188"/>
+            <a:off x="11209013" y="7383188"/>
             <a:ext cx="8712309" cy="4398862"/>
           </a:xfrm>
           <a:prstGeom prst="rect">
@@ -1777,8 +1777,8 @@
         </p:nvSpPr>
         <p:spPr>
           <a:xfrm>
-            <a:off x="1113882" y="12712366"/>
-            <a:ext cx="5698163" cy="596766"/>
+            <a:off x="1039503" y="12850388"/>
+            <a:ext cx="5846922" cy="568682"/>
           </a:xfrm>
           <a:prstGeom prst="rect">
             <a:avLst/>
@@ -1797,9 +1797,11 @@
               </a:lnSpc>
             </a:pPr>
             <a:r>
-              <a:rPr lang="fr-FR" sz="2400" spc="300" dirty="0">
-                <a:solidFill>
-                  <a:schemeClr val="bg1"/>
+              <a:rPr lang="fr-FR" sz="2000" spc="300" dirty="0">
+                <a:solidFill>
+                  <a:schemeClr val="bg1">
+                    <a:lumMod val="95000"/>
+                  </a:schemeClr>
                 </a:solidFill>
                 <a:latin typeface="Poppins" panose="02000000000000000000" pitchFamily="2" charset="77"/>
                 <a:ea typeface="Lato" charset="0"/>
@@ -1879,6 +1881,13 @@
       </p:transition>
     </mc:Fallback>
   </mc:AlternateContent>
+  <p:timing>
+    <p:tnLst>
+      <p:par>
+        <p:cTn id="1" dur="indefinite" restart="never" nodeType="tmRoot"/>
+      </p:par>
+    </p:tnLst>
+  </p:timing>
 </p:sld>
 </file>
 
@@ -1954,7 +1963,7 @@
         <p:spPr>
           <a:xfrm>
             <a:off x="4179698" y="11086795"/>
-            <a:ext cx="3483646" cy="738664"/>
+            <a:ext cx="1771639" cy="738664"/>
           </a:xfrm>
           <a:prstGeom prst="rect">
             <a:avLst/>
@@ -1968,7 +1977,7 @@
           <a:lstStyle/>
           <a:p>
             <a:r>
-              <a:rPr lang="en-US" sz="4200" b="1" dirty="0">
+              <a:rPr lang="en-US" sz="4200" b="1" dirty="0" err="1" smtClean="0">
                 <a:solidFill>
                   <a:schemeClr val="tx2"/>
                 </a:solidFill>
@@ -1976,8 +1985,16 @@
                 <a:ea typeface="Roboto" charset="0"/>
                 <a:cs typeface="Poppins Bold" panose="02000000000000000000" pitchFamily="2" charset="77"/>
               </a:rPr>
-              <a:t>ELEMENT 05</a:t>
-            </a:r>
+              <a:t>Démo</a:t>
+            </a:r>
+            <a:endParaRPr lang="en-US" sz="4200" b="1" dirty="0">
+              <a:solidFill>
+                <a:schemeClr val="tx2"/>
+              </a:solidFill>
+              <a:latin typeface="Poppins Bold" panose="02000000000000000000" pitchFamily="2" charset="77"/>
+              <a:ea typeface="Roboto" charset="0"/>
+              <a:cs typeface="Poppins Bold" panose="02000000000000000000" pitchFamily="2" charset="77"/>
+            </a:endParaRPr>
           </a:p>
         </p:txBody>
       </p:sp>
@@ -2036,7 +2053,7 @@
         <p:spPr>
           <a:xfrm>
             <a:off x="4179698" y="9116528"/>
-            <a:ext cx="3498073" cy="738664"/>
+            <a:ext cx="12558246" cy="738664"/>
           </a:xfrm>
           <a:prstGeom prst="rect">
             <a:avLst/>
@@ -2050,7 +2067,7 @@
           <a:lstStyle/>
           <a:p>
             <a:r>
-              <a:rPr lang="en-US" sz="4200" b="1" dirty="0">
+              <a:rPr lang="fr-FR" sz="4200" b="1" dirty="0" smtClean="0">
                 <a:solidFill>
                   <a:schemeClr val="tx2"/>
                 </a:solidFill>
@@ -2058,8 +2075,16 @@
                 <a:ea typeface="Roboto" charset="0"/>
                 <a:cs typeface="Poppins Bold" panose="02000000000000000000" pitchFamily="2" charset="77"/>
               </a:rPr>
-              <a:t>ELEMENT 04</a:t>
-            </a:r>
+              <a:t>Compression et décompression fonctionnelles</a:t>
+            </a:r>
+            <a:endParaRPr lang="fr-FR" sz="4200" b="1" dirty="0">
+              <a:solidFill>
+                <a:schemeClr val="tx2"/>
+              </a:solidFill>
+              <a:latin typeface="Poppins Bold" panose="02000000000000000000" pitchFamily="2" charset="77"/>
+              <a:ea typeface="Roboto" charset="0"/>
+              <a:cs typeface="Poppins Bold" panose="02000000000000000000" pitchFamily="2" charset="77"/>
+            </a:endParaRPr>
           </a:p>
         </p:txBody>
       </p:sp>
@@ -2118,7 +2143,7 @@
         <p:spPr>
           <a:xfrm>
             <a:off x="4112379" y="7186034"/>
-            <a:ext cx="3459601" cy="738664"/>
+            <a:ext cx="14098347" cy="738664"/>
           </a:xfrm>
           <a:prstGeom prst="rect">
             <a:avLst/>
@@ -2132,7 +2157,7 @@
           <a:lstStyle/>
           <a:p>
             <a:r>
-              <a:rPr lang="en-US" sz="4200" b="1" dirty="0">
+              <a:rPr lang="en-US" sz="4200" b="1" dirty="0" err="1" smtClean="0">
                 <a:solidFill>
                   <a:schemeClr val="tx2"/>
                 </a:solidFill>
@@ -2140,8 +2165,93 @@
                 <a:ea typeface="Roboto" charset="0"/>
                 <a:cs typeface="Poppins Bold" panose="02000000000000000000" pitchFamily="2" charset="77"/>
               </a:rPr>
-              <a:t>ELEMENT 03</a:t>
-            </a:r>
+              <a:t>Gestion</a:t>
+            </a:r>
+            <a:r>
+              <a:rPr lang="en-US" sz="4200" b="1" dirty="0" smtClean="0">
+                <a:solidFill>
+                  <a:schemeClr val="tx2"/>
+                </a:solidFill>
+                <a:latin typeface="Poppins Bold" panose="02000000000000000000" pitchFamily="2" charset="77"/>
+                <a:ea typeface="Roboto" charset="0"/>
+                <a:cs typeface="Poppins Bold" panose="02000000000000000000" pitchFamily="2" charset="77"/>
+              </a:rPr>
+              <a:t> du </a:t>
+            </a:r>
+            <a:r>
+              <a:rPr lang="en-US" sz="4200" b="1" dirty="0" err="1" smtClean="0">
+                <a:solidFill>
+                  <a:schemeClr val="tx2"/>
+                </a:solidFill>
+                <a:latin typeface="Poppins Bold" panose="02000000000000000000" pitchFamily="2" charset="77"/>
+                <a:ea typeface="Roboto" charset="0"/>
+                <a:cs typeface="Poppins Bold" panose="02000000000000000000" pitchFamily="2" charset="77"/>
+              </a:rPr>
+              <a:t>projet</a:t>
+            </a:r>
+            <a:r>
+              <a:rPr lang="en-US" sz="4200" b="1" dirty="0" smtClean="0">
+                <a:solidFill>
+                  <a:schemeClr val="tx2"/>
+                </a:solidFill>
+                <a:latin typeface="Poppins Bold" panose="02000000000000000000" pitchFamily="2" charset="77"/>
+                <a:ea typeface="Roboto" charset="0"/>
+                <a:cs typeface="Poppins Bold" panose="02000000000000000000" pitchFamily="2" charset="77"/>
+              </a:rPr>
+              <a:t> avec </a:t>
+            </a:r>
+            <a:r>
+              <a:rPr lang="en-US" sz="4200" b="1" dirty="0" err="1" smtClean="0">
+                <a:solidFill>
+                  <a:schemeClr val="tx2"/>
+                </a:solidFill>
+                <a:latin typeface="Poppins Bold" panose="02000000000000000000" pitchFamily="2" charset="77"/>
+                <a:ea typeface="Roboto" charset="0"/>
+                <a:cs typeface="Poppins Bold" panose="02000000000000000000" pitchFamily="2" charset="77"/>
+              </a:rPr>
+              <a:t>Github</a:t>
+            </a:r>
+            <a:r>
+              <a:rPr lang="en-US" sz="4200" b="1" dirty="0" smtClean="0">
+                <a:solidFill>
+                  <a:schemeClr val="tx2"/>
+                </a:solidFill>
+                <a:latin typeface="Poppins Bold" panose="02000000000000000000" pitchFamily="2" charset="77"/>
+                <a:ea typeface="Roboto" charset="0"/>
+                <a:cs typeface="Poppins Bold" panose="02000000000000000000" pitchFamily="2" charset="77"/>
+              </a:rPr>
+              <a:t> (Déjà 1 fork, </a:t>
+            </a:r>
+            <a:r>
+              <a:rPr lang="en-US" sz="4200" b="1" dirty="0" err="1" smtClean="0">
+                <a:solidFill>
+                  <a:schemeClr val="tx2"/>
+                </a:solidFill>
+                <a:latin typeface="Poppins Bold" panose="02000000000000000000" pitchFamily="2" charset="77"/>
+                <a:ea typeface="Roboto" charset="0"/>
+                <a:cs typeface="Poppins Bold" panose="02000000000000000000" pitchFamily="2" charset="77"/>
+              </a:rPr>
+              <a:t>woaw</a:t>
+            </a:r>
+            <a:r>
+              <a:rPr lang="en-US" sz="4200" b="1" dirty="0" smtClean="0">
+                <a:solidFill>
+                  <a:schemeClr val="tx2"/>
+                </a:solidFill>
+                <a:latin typeface="Poppins Bold" panose="02000000000000000000" pitchFamily="2" charset="77"/>
+                <a:ea typeface="Roboto" charset="0"/>
+                <a:cs typeface="Poppins Bold" panose="02000000000000000000" pitchFamily="2" charset="77"/>
+              </a:rPr>
+              <a:t>!)</a:t>
+            </a:r>
+            <a:endParaRPr lang="en-US" sz="4200" b="1" dirty="0">
+              <a:solidFill>
+                <a:schemeClr val="tx2"/>
+              </a:solidFill>
+              <a:latin typeface="Poppins Bold" panose="02000000000000000000" pitchFamily="2" charset="77"/>
+              <a:ea typeface="Roboto" charset="0"/>
+              <a:cs typeface="Poppins Bold" panose="02000000000000000000" pitchFamily="2" charset="77"/>
+            </a:endParaRPr>
           </a:p>
         </p:txBody>
       </p:sp>
@@ -2200,7 +2310,7 @@
         <p:spPr>
           <a:xfrm>
             <a:off x="4112379" y="5163433"/>
-            <a:ext cx="3441968" cy="738664"/>
+            <a:ext cx="16389871" cy="738664"/>
           </a:xfrm>
           <a:prstGeom prst="rect">
             <a:avLst/>
@@ -2214,7 +2324,7 @@
           <a:lstStyle/>
           <a:p>
             <a:r>
-              <a:rPr lang="en-US" sz="4200" b="1" dirty="0">
+              <a:rPr lang="en-US" sz="4200" b="1" dirty="0" err="1" smtClean="0">
                 <a:solidFill>
                   <a:schemeClr val="tx2"/>
                 </a:solidFill>
@@ -2222,8 +2332,82 @@
                 <a:ea typeface="Roboto" charset="0"/>
                 <a:cs typeface="Poppins Bold" panose="02000000000000000000" pitchFamily="2" charset="77"/>
               </a:rPr>
-              <a:t>ELEMENT 02</a:t>
-            </a:r>
+              <a:t>Utilisation</a:t>
+            </a:r>
+            <a:r>
+              <a:rPr lang="en-US" sz="4200" b="1" dirty="0" smtClean="0">
+                <a:solidFill>
+                  <a:schemeClr val="tx2"/>
+                </a:solidFill>
+                <a:latin typeface="Poppins Bold" panose="02000000000000000000" pitchFamily="2" charset="77"/>
+                <a:ea typeface="Roboto" charset="0"/>
+                <a:cs typeface="Poppins Bold" panose="02000000000000000000" pitchFamily="2" charset="77"/>
+              </a:rPr>
+              <a:t> des </a:t>
+            </a:r>
+            <a:r>
+              <a:rPr lang="en-US" sz="4200" b="1" dirty="0" err="1" smtClean="0">
+                <a:solidFill>
+                  <a:schemeClr val="tx2"/>
+                </a:solidFill>
+                <a:latin typeface="Poppins Bold" panose="02000000000000000000" pitchFamily="2" charset="77"/>
+                <a:ea typeface="Roboto" charset="0"/>
+                <a:cs typeface="Poppins Bold" panose="02000000000000000000" pitchFamily="2" charset="77"/>
+              </a:rPr>
+              <a:t>librairies</a:t>
+            </a:r>
+            <a:r>
+              <a:rPr lang="en-US" sz="4200" b="1" dirty="0" smtClean="0">
+                <a:solidFill>
+                  <a:schemeClr val="tx2"/>
+                </a:solidFill>
+                <a:latin typeface="Poppins Bold" panose="02000000000000000000" pitchFamily="2" charset="77"/>
+                <a:ea typeface="Roboto" charset="0"/>
+                <a:cs typeface="Poppins Bold" panose="02000000000000000000" pitchFamily="2" charset="77"/>
+              </a:rPr>
+              <a:t> : java.io, </a:t>
+            </a:r>
+            <a:r>
+              <a:rPr lang="en-US" sz="4200" b="1" dirty="0" err="1" smtClean="0">
+                <a:solidFill>
+                  <a:schemeClr val="tx2"/>
+                </a:solidFill>
+                <a:latin typeface="Poppins Bold" panose="02000000000000000000" pitchFamily="2" charset="77"/>
+                <a:ea typeface="Roboto" charset="0"/>
+                <a:cs typeface="Poppins Bold" panose="02000000000000000000" pitchFamily="2" charset="77"/>
+              </a:rPr>
+              <a:t>java.util</a:t>
+            </a:r>
+            <a:r>
+              <a:rPr lang="en-US" sz="4200" b="1" dirty="0">
+                <a:solidFill>
+                  <a:schemeClr val="tx2"/>
+                </a:solidFill>
+                <a:latin typeface="Poppins Bold" panose="02000000000000000000" pitchFamily="2" charset="77"/>
+                <a:ea typeface="Roboto" charset="0"/>
+                <a:cs typeface="Poppins Bold" panose="02000000000000000000" pitchFamily="2" charset="77"/>
+              </a:rPr>
+              <a:t>, </a:t>
+            </a:r>
+            <a:r>
+              <a:rPr lang="en-US" sz="4200" b="1" dirty="0" err="1" smtClean="0">
+                <a:solidFill>
+                  <a:schemeClr val="tx2"/>
+                </a:solidFill>
+                <a:latin typeface="Poppins Bold" panose="02000000000000000000" pitchFamily="2" charset="77"/>
+                <a:ea typeface="Roboto" charset="0"/>
+                <a:cs typeface="Poppins Bold" panose="02000000000000000000" pitchFamily="2" charset="77"/>
+              </a:rPr>
+              <a:t>java.nio.charset</a:t>
+            </a:r>
+            <a:endParaRPr lang="en-US" sz="4200" b="1" dirty="0">
+              <a:solidFill>
+                <a:schemeClr val="tx2"/>
+              </a:solidFill>
+              <a:latin typeface="Poppins Bold" panose="02000000000000000000" pitchFamily="2" charset="77"/>
+              <a:ea typeface="Roboto" charset="0"/>
+              <a:cs typeface="Poppins Bold" panose="02000000000000000000" pitchFamily="2" charset="77"/>
+            </a:endParaRPr>
           </a:p>
         </p:txBody>
       </p:sp>
@@ -2279,7 +2463,7 @@
         <p:spPr>
           <a:xfrm>
             <a:off x="4112379" y="3191281"/>
-            <a:ext cx="3360215" cy="738664"/>
+            <a:ext cx="19308491" cy="738664"/>
           </a:xfrm>
           <a:prstGeom prst="rect">
             <a:avLst/>
@@ -2293,7 +2477,7 @@
           <a:lstStyle/>
           <a:p>
             <a:r>
-              <a:rPr lang="en-US" sz="4200" b="1" dirty="0">
+              <a:rPr lang="en-US" sz="4200" b="1" dirty="0" err="1" smtClean="0">
                 <a:solidFill>
                   <a:schemeClr val="tx2"/>
                 </a:solidFill>
@@ -2301,8 +2485,104 @@
                 <a:ea typeface="Roboto" charset="0"/>
                 <a:cs typeface="Poppins Bold" panose="02000000000000000000" pitchFamily="2" charset="77"/>
               </a:rPr>
-              <a:t>ELEMENT 01</a:t>
-            </a:r>
+              <a:t>Découpage</a:t>
+            </a:r>
+            <a:r>
+              <a:rPr lang="en-US" sz="4200" b="1" dirty="0" smtClean="0">
+                <a:solidFill>
+                  <a:schemeClr val="tx2"/>
+                </a:solidFill>
+                <a:latin typeface="Poppins Bold" panose="02000000000000000000" pitchFamily="2" charset="77"/>
+                <a:ea typeface="Roboto" charset="0"/>
+                <a:cs typeface="Poppins Bold" panose="02000000000000000000" pitchFamily="2" charset="77"/>
+              </a:rPr>
+              <a:t> du </a:t>
+            </a:r>
+            <a:r>
+              <a:rPr lang="en-US" sz="4200" b="1" dirty="0" err="1" smtClean="0">
+                <a:solidFill>
+                  <a:schemeClr val="tx2"/>
+                </a:solidFill>
+                <a:latin typeface="Poppins Bold" panose="02000000000000000000" pitchFamily="2" charset="77"/>
+                <a:ea typeface="Roboto" charset="0"/>
+                <a:cs typeface="Poppins Bold" panose="02000000000000000000" pitchFamily="2" charset="77"/>
+              </a:rPr>
+              <a:t>projet</a:t>
+            </a:r>
+            <a:r>
+              <a:rPr lang="en-US" sz="4200" b="1" dirty="0" smtClean="0">
+                <a:solidFill>
+                  <a:schemeClr val="tx2"/>
+                </a:solidFill>
+                <a:latin typeface="Poppins Bold" panose="02000000000000000000" pitchFamily="2" charset="77"/>
+                <a:ea typeface="Roboto" charset="0"/>
+                <a:cs typeface="Poppins Bold" panose="02000000000000000000" pitchFamily="2" charset="77"/>
+              </a:rPr>
+              <a:t> </a:t>
+            </a:r>
+            <a:r>
+              <a:rPr lang="en-US" sz="4200" b="1" dirty="0" err="1" smtClean="0">
+                <a:solidFill>
+                  <a:schemeClr val="tx2"/>
+                </a:solidFill>
+                <a:latin typeface="Poppins Bold" panose="02000000000000000000" pitchFamily="2" charset="77"/>
+                <a:ea typeface="Roboto" charset="0"/>
+                <a:cs typeface="Poppins Bold" panose="02000000000000000000" pitchFamily="2" charset="77"/>
+              </a:rPr>
+              <a:t>en</a:t>
+            </a:r>
+            <a:r>
+              <a:rPr lang="en-US" sz="4200" b="1" dirty="0" smtClean="0">
+                <a:solidFill>
+                  <a:schemeClr val="tx2"/>
+                </a:solidFill>
+                <a:latin typeface="Poppins Bold" panose="02000000000000000000" pitchFamily="2" charset="77"/>
+                <a:ea typeface="Roboto" charset="0"/>
+                <a:cs typeface="Poppins Bold" panose="02000000000000000000" pitchFamily="2" charset="77"/>
+              </a:rPr>
+              <a:t> 4 classes : Main, Huffman, </a:t>
+            </a:r>
+            <a:r>
+              <a:rPr lang="en-US" sz="4200" b="1" dirty="0" err="1">
+                <a:solidFill>
+                  <a:schemeClr val="tx2"/>
+                </a:solidFill>
+                <a:latin typeface="Poppins Bold" panose="02000000000000000000" pitchFamily="2" charset="77"/>
+                <a:ea typeface="Roboto" charset="0"/>
+                <a:cs typeface="Poppins Bold" panose="02000000000000000000" pitchFamily="2" charset="77"/>
+              </a:rPr>
+              <a:t>P</a:t>
+            </a:r>
+            <a:r>
+              <a:rPr lang="en-US" sz="4200" b="1" dirty="0" err="1" smtClean="0">
+                <a:solidFill>
+                  <a:schemeClr val="tx2"/>
+                </a:solidFill>
+                <a:latin typeface="Poppins Bold" panose="02000000000000000000" pitchFamily="2" charset="77"/>
+                <a:ea typeface="Roboto" charset="0"/>
+                <a:cs typeface="Poppins Bold" panose="02000000000000000000" pitchFamily="2" charset="77"/>
+              </a:rPr>
+              <a:t>arseFreq</a:t>
+            </a:r>
+            <a:r>
+              <a:rPr lang="en-US" sz="4200" b="1" dirty="0" smtClean="0">
+                <a:solidFill>
+                  <a:schemeClr val="tx2"/>
+                </a:solidFill>
+                <a:latin typeface="Poppins Bold" panose="02000000000000000000" pitchFamily="2" charset="77"/>
+                <a:ea typeface="Roboto" charset="0"/>
+                <a:cs typeface="Poppins Bold" panose="02000000000000000000" pitchFamily="2" charset="77"/>
+              </a:rPr>
+              <a:t> et Node</a:t>
+            </a:r>
+            <a:endParaRPr lang="en-US" sz="4200" b="1" dirty="0">
+              <a:solidFill>
+                <a:schemeClr val="tx2"/>
+              </a:solidFill>
+              <a:latin typeface="Poppins Bold" panose="02000000000000000000" pitchFamily="2" charset="77"/>
+              <a:ea typeface="Roboto" charset="0"/>
+              <a:cs typeface="Poppins Bold" panose="02000000000000000000" pitchFamily="2" charset="77"/>
+            </a:endParaRPr>
           </a:p>
         </p:txBody>
       </p:sp>
@@ -2322,8 +2602,8 @@
         </p:nvSpPr>
         <p:spPr bwMode="auto">
           <a:xfrm>
-            <a:off x="2492593" y="974936"/>
-            <a:ext cx="5253041" cy="1231106"/>
+            <a:off x="2241725" y="974936"/>
+            <a:ext cx="5754781" cy="1231106"/>
           </a:xfrm>
           <a:prstGeom prst="rect">
             <a:avLst/>
@@ -2334,14 +2614,14 @@
           </a:ln>
           <a:extLst>
             <a:ext uri="{909E8E84-426E-40dd-AFC4-6F175D3DCCD1}">
-              <a14:hiddenFill xmlns="" xmlns:a14="http://schemas.microsoft.com/office/drawing/2010/main">
+              <a14:hiddenFill xmlns:a14="http://schemas.microsoft.com/office/drawing/2010/main" xmlns="">
                 <a:solidFill>
                   <a:srgbClr val="FFFFFF"/>
                 </a:solidFill>
               </a14:hiddenFill>
             </a:ext>
             <a:ext uri="{91240B29-F687-4f45-9708-019B960494DF}">
-              <a14:hiddenLine xmlns="" xmlns:a14="http://schemas.microsoft.com/office/drawing/2010/main" w="12700">
+              <a14:hiddenLine xmlns:a14="http://schemas.microsoft.com/office/drawing/2010/main" xmlns="" w="12700">
                 <a:solidFill>
                   <a:schemeClr val="tx1"/>
                 </a:solidFill>
@@ -2360,7 +2640,7 @@
           <a:p>
             <a:pPr algn="ctr"/>
             <a:r>
-              <a:rPr lang="en-US" sz="8000" b="1" spc="300" dirty="0">
+              <a:rPr lang="fr-FR" sz="8000" b="1" spc="300" dirty="0" smtClean="0">
                 <a:solidFill>
                   <a:schemeClr val="tx2"/>
                 </a:solidFill>
@@ -2369,7 +2649,19 @@
                 <a:cs typeface="Poppins Bold" panose="02000000000000000000" pitchFamily="2" charset="77"/>
                 <a:sym typeface="Bebas Neue" charset="0"/>
               </a:rPr>
-              <a:t>SOMMAIRE</a:t>
+              <a:t>Projet</a:t>
+            </a:r>
+            <a:r>
+              <a:rPr lang="en-US" sz="8000" b="1" spc="300" dirty="0" smtClean="0">
+                <a:solidFill>
+                  <a:schemeClr val="tx2"/>
+                </a:solidFill>
+                <a:latin typeface="Poppins Bold" panose="02000000000000000000" pitchFamily="2" charset="77"/>
+                <a:ea typeface="Roboto" charset="0"/>
+                <a:cs typeface="Poppins Bold" panose="02000000000000000000" pitchFamily="2" charset="77"/>
+                <a:sym typeface="Bebas Neue" charset="0"/>
+              </a:rPr>
+              <a:t> 632</a:t>
             </a:r>
             <a:endParaRPr lang="en-US" sz="8000" b="1" spc="300" dirty="0">
               <a:solidFill>
@@ -2588,45 +2880,6 @@
           </a:p>
         </p:txBody>
       </p:sp>
-      <p:pic>
-        <p:nvPicPr>
-          <p:cNvPr id="6" name="Graphique 5" descr="Liste">
-            <a:extLst>
-              <a:ext uri="{FF2B5EF4-FFF2-40B4-BE49-F238E27FC236}">
-                <a16:creationId xmlns:a16="http://schemas.microsoft.com/office/drawing/2014/main" id="{E138761E-2871-49CF-B3BE-0296CE8BDEB9}"/>
-              </a:ext>
-            </a:extLst>
-          </p:cNvPr>
-          <p:cNvPicPr>
-            <a:picLocks noChangeAspect="1"/>
-          </p:cNvPicPr>
-          <p:nvPr/>
-        </p:nvPicPr>
-        <p:blipFill>
-          <a:blip r:embed="rId2">
-            <a:extLst>
-              <a:ext uri="{28A0092B-C50C-407E-A947-70E740481C1C}">
-                <a14:useLocalDpi xmlns:a14="http://schemas.microsoft.com/office/drawing/2010/main" val="0"/>
-              </a:ext>
-              <a:ext uri="{96DAC541-7B7A-43D3-8B79-37D633B846F1}">
-                <asvg:svgBlip xmlns:asvg="http://schemas.microsoft.com/office/drawing/2016/SVG/main" r:embed="rId3"/>
-              </a:ext>
-            </a:extLst>
-          </a:blip>
-          <a:stretch>
-            <a:fillRect/>
-          </a:stretch>
-        </p:blipFill>
-        <p:spPr>
-          <a:xfrm>
-            <a:off x="15087701" y="3745094"/>
-            <a:ext cx="6502587" cy="6502587"/>
-          </a:xfrm>
-          <a:prstGeom prst="rect">
-            <a:avLst/>
-          </a:prstGeom>
-        </p:spPr>
-      </p:pic>
     </p:spTree>
     <p:extLst>
       <p:ext uri="{BB962C8B-B14F-4D97-AF65-F5344CB8AC3E}">
@@ -2645,6 +2898,13 @@
       <p:transition/>
     </mc:Fallback>
   </mc:AlternateContent>
+  <p:timing>
+    <p:tnLst>
+      <p:par>
+        <p:cTn id="1" dur="indefinite" restart="never" nodeType="tmRoot"/>
+      </p:par>
+    </p:tnLst>
+  </p:timing>
 </p:sld>
 </file>
 

</xml_diff>

<commit_message>
Ajout de la derniere slide
</commit_message>
<xml_diff>
--- a/Présentation - Powerpoint.pptx
+++ b/Présentation - Powerpoint.pptx
@@ -5,12 +5,13 @@
     <p:sldMasterId id="2147483966" r:id="rId1"/>
   </p:sldMasterIdLst>
   <p:notesMasterIdLst>
-    <p:notesMasterId r:id="rId5"/>
+    <p:notesMasterId r:id="rId6"/>
   </p:notesMasterIdLst>
   <p:sldIdLst>
     <p:sldId id="256" r:id="rId2"/>
     <p:sldId id="2572" r:id="rId3"/>
     <p:sldId id="2573" r:id="rId4"/>
+    <p:sldId id="2574" r:id="rId5"/>
   </p:sldIdLst>
   <p:sldSz cx="24377650" cy="13716000"/>
   <p:notesSz cx="6858000" cy="9144000"/>
@@ -2615,14 +2616,14 @@
           </a:ln>
           <a:extLst>
             <a:ext uri="{909E8E84-426E-40dd-AFC4-6F175D3DCCD1}">
-              <a14:hiddenFill xmlns="" xmlns:a14="http://schemas.microsoft.com/office/drawing/2010/main">
+              <a14:hiddenFill xmlns:a14="http://schemas.microsoft.com/office/drawing/2010/main" xmlns="">
                 <a:solidFill>
                   <a:srgbClr val="FFFFFF"/>
                 </a:solidFill>
               </a14:hiddenFill>
             </a:ext>
             <a:ext uri="{91240B29-F687-4f45-9708-019B960494DF}">
-              <a14:hiddenLine xmlns="" xmlns:a14="http://schemas.microsoft.com/office/drawing/2010/main" w="12700">
+              <a14:hiddenLine xmlns:a14="http://schemas.microsoft.com/office/drawing/2010/main" xmlns="" w="12700">
                 <a:solidFill>
                   <a:schemeClr val="tx1"/>
                 </a:solidFill>
@@ -2891,13 +2892,13 @@
   <p:clrMapOvr>
     <a:masterClrMapping/>
   </p:clrMapOvr>
-  <mc:AlternateContent xmlns:mc="http://schemas.openxmlformats.org/markup-compatibility/2006">
-    <mc:Choice xmlns:p14="http://schemas.microsoft.com/office/powerpoint/2010/main" Requires="p14">
+  <mc:AlternateContent xmlns:mc="http://schemas.openxmlformats.org/markup-compatibility/2006" xmlns:p14="http://schemas.microsoft.com/office/powerpoint/2010/main">
+    <mc:Choice Requires="p14">
       <p:transition spd="slow" p14:dur="3400">
         <p14:reveal/>
       </p:transition>
     </mc:Choice>
-    <mc:Fallback>
+    <mc:Fallback xmlns="">
       <p:transition spd="slow">
         <p:fade/>
       </p:transition>
@@ -3541,14 +3542,6 @@
               </a:rPr>
               <a:t>)</a:t>
             </a:r>
-            <a:endParaRPr lang="en-US" sz="2800" b="1" dirty="0">
-              <a:solidFill>
-                <a:schemeClr val="tx2"/>
-              </a:solidFill>
-              <a:latin typeface="Poppins Bold" panose="02000000000000000000" pitchFamily="2" charset="77"/>
-              <a:ea typeface="Roboto" charset="0"/>
-              <a:cs typeface="Poppins Bold" panose="02000000000000000000" pitchFamily="2" charset="77"/>
-            </a:endParaRPr>
           </a:p>
         </p:txBody>
       </p:sp>
@@ -3729,12 +3722,6 @@
               </a:rPr>
               <a:t>6</a:t>
             </a:r>
-            <a:endParaRPr lang="en-GB" b="1" dirty="0">
-              <a:solidFill>
-                <a:schemeClr val="bg1"/>
-              </a:solidFill>
-              <a:latin typeface="Poppins Bold" panose="02000000000000000000"/>
-            </a:endParaRPr>
           </a:p>
         </p:txBody>
       </p:sp>
@@ -3959,14 +3946,6 @@
               </a:rPr>
               <a:t>)</a:t>
             </a:r>
-            <a:endParaRPr lang="en-US" sz="2800" b="1" dirty="0">
-              <a:solidFill>
-                <a:schemeClr val="tx2"/>
-              </a:solidFill>
-              <a:latin typeface="Poppins Bold" panose="02000000000000000000" pitchFamily="2" charset="77"/>
-              <a:ea typeface="Roboto" charset="0"/>
-              <a:cs typeface="Poppins Bold" panose="02000000000000000000" pitchFamily="2" charset="77"/>
-            </a:endParaRPr>
           </a:p>
         </p:txBody>
       </p:sp>
@@ -4147,14 +4126,6 @@
               </a:rPr>
               <a:t>&lt;Node&gt; nodes)</a:t>
             </a:r>
-            <a:endParaRPr lang="en-US" sz="2800" b="1" dirty="0">
-              <a:solidFill>
-                <a:schemeClr val="tx2"/>
-              </a:solidFill>
-              <a:latin typeface="Poppins Bold" panose="02000000000000000000" pitchFamily="2" charset="77"/>
-              <a:ea typeface="Roboto" charset="0"/>
-              <a:cs typeface="Poppins Bold" panose="02000000000000000000" pitchFamily="2" charset="77"/>
-            </a:endParaRPr>
           </a:p>
         </p:txBody>
       </p:sp>
@@ -4445,14 +4416,6 @@
               </a:rPr>
               <a:t>)</a:t>
             </a:r>
-            <a:endParaRPr lang="en-US" sz="2800" b="1" dirty="0">
-              <a:solidFill>
-                <a:schemeClr val="tx2"/>
-              </a:solidFill>
-              <a:latin typeface="Poppins Bold" panose="02000000000000000000" pitchFamily="2" charset="77"/>
-              <a:ea typeface="Roboto" charset="0"/>
-              <a:cs typeface="Poppins Bold" panose="02000000000000000000" pitchFamily="2" charset="77"/>
-            </a:endParaRPr>
           </a:p>
         </p:txBody>
       </p:sp>
@@ -4589,14 +4552,6 @@
               </a:rPr>
               <a:t>()</a:t>
             </a:r>
-            <a:endParaRPr lang="en-US" sz="2800" b="1" dirty="0">
-              <a:solidFill>
-                <a:schemeClr val="tx2"/>
-              </a:solidFill>
-              <a:latin typeface="Poppins Bold" panose="02000000000000000000" pitchFamily="2" charset="77"/>
-              <a:ea typeface="Roboto" charset="0"/>
-              <a:cs typeface="Poppins Bold" panose="02000000000000000000" pitchFamily="2" charset="77"/>
-            </a:endParaRPr>
           </a:p>
         </p:txBody>
       </p:sp>
@@ -4766,14 +4721,6 @@
               </a:rPr>
               <a:t>&lt;Node&gt; nodes)</a:t>
             </a:r>
-            <a:endParaRPr lang="en-US" sz="2800" b="1" dirty="0">
-              <a:solidFill>
-                <a:schemeClr val="tx2"/>
-              </a:solidFill>
-              <a:latin typeface="Poppins Bold" panose="02000000000000000000" pitchFamily="2" charset="77"/>
-              <a:ea typeface="Roboto" charset="0"/>
-              <a:cs typeface="Poppins Bold" panose="02000000000000000000" pitchFamily="2" charset="77"/>
-            </a:endParaRPr>
           </a:p>
         </p:txBody>
       </p:sp>
@@ -5020,14 +4967,6 @@
               </a:rPr>
               <a:t>)</a:t>
             </a:r>
-            <a:endParaRPr lang="en-US" sz="2800" b="1" dirty="0">
-              <a:solidFill>
-                <a:schemeClr val="tx2"/>
-              </a:solidFill>
-              <a:latin typeface="Poppins Bold" panose="02000000000000000000" pitchFamily="2" charset="77"/>
-              <a:ea typeface="Roboto" charset="0"/>
-              <a:cs typeface="Poppins Bold" panose="02000000000000000000" pitchFamily="2" charset="77"/>
-            </a:endParaRPr>
           </a:p>
         </p:txBody>
       </p:sp>
@@ -5596,14 +5535,6 @@
               </a:rPr>
               <a:t>(String URL)</a:t>
             </a:r>
-            <a:endParaRPr lang="en-US" sz="2800" b="1" dirty="0">
-              <a:solidFill>
-                <a:schemeClr val="tx2"/>
-              </a:solidFill>
-              <a:latin typeface="Poppins Bold" panose="02000000000000000000" pitchFamily="2" charset="77"/>
-              <a:ea typeface="Roboto" charset="0"/>
-              <a:cs typeface="Poppins Bold" panose="02000000000000000000" pitchFamily="2" charset="77"/>
-            </a:endParaRPr>
           </a:p>
         </p:txBody>
       </p:sp>
@@ -5691,12 +5622,6 @@
               </a:rPr>
               <a:t>6</a:t>
             </a:r>
-            <a:endParaRPr lang="en-GB" b="1" dirty="0">
-              <a:solidFill>
-                <a:schemeClr val="bg1"/>
-              </a:solidFill>
-              <a:latin typeface="Poppins Bold" panose="02000000000000000000"/>
-            </a:endParaRPr>
           </a:p>
         </p:txBody>
       </p:sp>
@@ -5833,14 +5758,6 @@
               </a:rPr>
               <a:t>(String URL)</a:t>
             </a:r>
-            <a:endParaRPr lang="en-US" sz="2800" b="1" dirty="0">
-              <a:solidFill>
-                <a:schemeClr val="tx2"/>
-              </a:solidFill>
-              <a:latin typeface="Poppins Bold" panose="02000000000000000000" pitchFamily="2" charset="77"/>
-              <a:ea typeface="Roboto" charset="0"/>
-              <a:cs typeface="Poppins Bold" panose="02000000000000000000" pitchFamily="2" charset="77"/>
-            </a:endParaRPr>
           </a:p>
         </p:txBody>
       </p:sp>
@@ -6043,14 +5960,6 @@
               </a:rPr>
               <a:t>)</a:t>
             </a:r>
-            <a:endParaRPr lang="en-US" sz="2800" b="1" dirty="0">
-              <a:solidFill>
-                <a:schemeClr val="tx2"/>
-              </a:solidFill>
-              <a:latin typeface="Poppins Bold" panose="02000000000000000000" pitchFamily="2" charset="77"/>
-              <a:ea typeface="Roboto" charset="0"/>
-              <a:cs typeface="Poppins Bold" panose="02000000000000000000" pitchFamily="2" charset="77"/>
-            </a:endParaRPr>
           </a:p>
         </p:txBody>
       </p:sp>
@@ -6231,14 +6140,6 @@
               </a:rPr>
               <a:t>&lt;Node&gt; nodes)</a:t>
             </a:r>
-            <a:endParaRPr lang="en-US" sz="2800" b="1" dirty="0">
-              <a:solidFill>
-                <a:schemeClr val="tx2"/>
-              </a:solidFill>
-              <a:latin typeface="Poppins Bold" panose="02000000000000000000" pitchFamily="2" charset="77"/>
-              <a:ea typeface="Roboto" charset="0"/>
-              <a:cs typeface="Poppins Bold" panose="02000000000000000000" pitchFamily="2" charset="77"/>
-            </a:endParaRPr>
           </a:p>
         </p:txBody>
       </p:sp>
@@ -6529,14 +6430,6 @@
               </a:rPr>
               <a:t>)</a:t>
             </a:r>
-            <a:endParaRPr lang="en-US" sz="2800" b="1" dirty="0">
-              <a:solidFill>
-                <a:schemeClr val="tx2"/>
-              </a:solidFill>
-              <a:latin typeface="Poppins Bold" panose="02000000000000000000" pitchFamily="2" charset="77"/>
-              <a:ea typeface="Roboto" charset="0"/>
-              <a:cs typeface="Poppins Bold" panose="02000000000000000000" pitchFamily="2" charset="77"/>
-            </a:endParaRPr>
           </a:p>
         </p:txBody>
       </p:sp>
@@ -6717,14 +6610,6 @@
               </a:rPr>
               <a:t>)</a:t>
             </a:r>
-            <a:endParaRPr lang="en-US" sz="2500" b="1" dirty="0">
-              <a:solidFill>
-                <a:schemeClr val="tx2"/>
-              </a:solidFill>
-              <a:latin typeface="Poppins Bold" panose="02000000000000000000" pitchFamily="2" charset="77"/>
-              <a:ea typeface="Roboto" charset="0"/>
-              <a:cs typeface="Poppins Bold" panose="02000000000000000000" pitchFamily="2" charset="77"/>
-            </a:endParaRPr>
           </a:p>
         </p:txBody>
       </p:sp>
@@ -6915,13 +6800,13 @@
   <p:clrMapOvr>
     <a:masterClrMapping/>
   </p:clrMapOvr>
-  <mc:AlternateContent xmlns:mc="http://schemas.openxmlformats.org/markup-compatibility/2006">
-    <mc:Choice xmlns:p14="http://schemas.microsoft.com/office/powerpoint/2010/main" Requires="p14">
+  <mc:AlternateContent xmlns:mc="http://schemas.openxmlformats.org/markup-compatibility/2006" xmlns:p14="http://schemas.microsoft.com/office/powerpoint/2010/main">
+    <mc:Choice Requires="p14">
       <p:transition spd="med" p14:dur="700">
         <p:fade/>
       </p:transition>
     </mc:Choice>
-    <mc:Fallback>
+    <mc:Fallback xmlns="">
       <p:transition spd="med">
         <p:fade/>
       </p:transition>
@@ -6934,6 +6819,103 @@
       </p:par>
     </p:tnLst>
   </p:timing>
+</p:sld>
+</file>
+
+<file path=ppt/slides/slide4.xml><?xml version="1.0" encoding="utf-8"?>
+<p:sld xmlns:a="http://schemas.openxmlformats.org/drawingml/2006/main" xmlns:r="http://schemas.openxmlformats.org/officeDocument/2006/relationships" xmlns:p="http://schemas.openxmlformats.org/presentationml/2006/main">
+  <p:cSld>
+    <p:spTree>
+      <p:nvGrpSpPr>
+        <p:cNvPr id="1" name=""/>
+        <p:cNvGrpSpPr/>
+        <p:nvPr/>
+      </p:nvGrpSpPr>
+      <p:grpSpPr>
+        <a:xfrm>
+          <a:off x="0" y="0"/>
+          <a:ext cx="0" cy="0"/>
+          <a:chOff x="0" y="0"/>
+          <a:chExt cx="0" cy="0"/>
+        </a:xfrm>
+      </p:grpSpPr>
+      <p:sp>
+        <p:nvSpPr>
+          <p:cNvPr id="2" name="ZoneTexte 1"/>
+          <p:cNvSpPr txBox="1"/>
+          <p:nvPr/>
+        </p:nvSpPr>
+        <p:spPr>
+          <a:xfrm>
+            <a:off x="1673524" y="862642"/>
+            <a:ext cx="15130733" cy="2554545"/>
+          </a:xfrm>
+          <a:prstGeom prst="rect">
+            <a:avLst/>
+          </a:prstGeom>
+          <a:noFill/>
+        </p:spPr>
+        <p:txBody>
+          <a:bodyPr wrap="square" rtlCol="0">
+            <a:spAutoFit/>
+          </a:bodyPr>
+          <a:lstStyle/>
+          <a:p>
+            <a:r>
+              <a:rPr lang="fr-FR" sz="8000" dirty="0" smtClean="0"/>
+              <a:t>C’est moi qui ai trouvé ISO-8859-1, voilà !</a:t>
+            </a:r>
+            <a:endParaRPr lang="fr-FR" sz="8000" dirty="0"/>
+          </a:p>
+        </p:txBody>
+      </p:sp>
+      <p:sp>
+        <p:nvSpPr>
+          <p:cNvPr id="3" name="ZoneTexte 2"/>
+          <p:cNvSpPr txBox="1"/>
+          <p:nvPr/>
+        </p:nvSpPr>
+        <p:spPr>
+          <a:xfrm>
+            <a:off x="16114143" y="8177842"/>
+            <a:ext cx="1777042" cy="369332"/>
+          </a:xfrm>
+          <a:prstGeom prst="rect">
+            <a:avLst/>
+          </a:prstGeom>
+          <a:noFill/>
+        </p:spPr>
+        <p:txBody>
+          <a:bodyPr wrap="square" rtlCol="0">
+            <a:spAutoFit/>
+          </a:bodyPr>
+          <a:lstStyle/>
+          <a:p>
+            <a:r>
+              <a:rPr lang="fr-FR" sz="1800" dirty="0" smtClean="0"/>
+              <a:t>Merci </a:t>
+            </a:r>
+            <a:r>
+              <a:rPr lang="fr-FR" sz="1800" dirty="0" smtClean="0">
+                <a:sym typeface="Wingdings" panose="05000000000000000000" pitchFamily="2" charset="2"/>
+              </a:rPr>
+              <a:t></a:t>
+            </a:r>
+            <a:endParaRPr lang="fr-FR" sz="1800" dirty="0"/>
+          </a:p>
+        </p:txBody>
+      </p:sp>
+    </p:spTree>
+    <p:extLst>
+      <p:ext uri="{BB962C8B-B14F-4D97-AF65-F5344CB8AC3E}">
+        <p14:creationId xmlns:p14="http://schemas.microsoft.com/office/powerpoint/2010/main" val="1634024390"/>
+      </p:ext>
+    </p:extLst>
+  </p:cSld>
+  <p:clrMapOvr>
+    <a:masterClrMapping/>
+  </p:clrMapOvr>
+  <p:transition/>
 </p:sld>
 </file>
 

</xml_diff>